<commit_message>
Ditance from point optimisation added
</commit_message>
<xml_diff>
--- a/Project report.pptx
+++ b/Project report.pptx
@@ -5,7 +5,7 @@
     <p:sldMasterId id="2147483648" r:id="rId1"/>
   </p:sldMasterIdLst>
   <p:notesMasterIdLst>
-    <p:notesMasterId r:id="rId13"/>
+    <p:notesMasterId r:id="rId14"/>
   </p:notesMasterIdLst>
   <p:sldIdLst>
     <p:sldId id="256" r:id="rId2"/>
@@ -17,8 +17,9 @@
     <p:sldId id="262" r:id="rId8"/>
     <p:sldId id="263" r:id="rId9"/>
     <p:sldId id="264" r:id="rId10"/>
-    <p:sldId id="265" r:id="rId11"/>
-    <p:sldId id="266" r:id="rId12"/>
+    <p:sldId id="267" r:id="rId11"/>
+    <p:sldId id="265" r:id="rId12"/>
+    <p:sldId id="266" r:id="rId13"/>
   </p:sldIdLst>
   <p:sldSz cx="12192000" cy="6858000"/>
   <p:notesSz cx="6858000" cy="9144000"/>
@@ -210,7 +211,7 @@
           <a:p>
             <a:fld id="{BF54C7B1-CF05-4A65-9C67-C0268DA06BD2}" type="datetimeFigureOut">
               <a:rPr lang="en-GB" smtClean="0"/>
-              <a:t>08/07/2020</a:t>
+              <a:t>12/07/2020</a:t>
             </a:fld>
             <a:endParaRPr lang="en-GB"/>
           </a:p>
@@ -969,7 +970,7 @@
           <a:p>
             <a:fld id="{65EF4D56-C8F2-4A57-8E8C-72E888F130BC}" type="datetimeFigureOut">
               <a:rPr lang="en-GB" smtClean="0"/>
-              <a:t>08/07/2020</a:t>
+              <a:t>12/07/2020</a:t>
             </a:fld>
             <a:endParaRPr lang="en-GB"/>
           </a:p>
@@ -1179,7 +1180,7 @@
           <a:p>
             <a:fld id="{65EF4D56-C8F2-4A57-8E8C-72E888F130BC}" type="datetimeFigureOut">
               <a:rPr lang="en-GB" smtClean="0"/>
-              <a:t>08/07/2020</a:t>
+              <a:t>12/07/2020</a:t>
             </a:fld>
             <a:endParaRPr lang="en-GB"/>
           </a:p>
@@ -1686,7 +1687,7 @@
           <a:p>
             <a:fld id="{65EF4D56-C8F2-4A57-8E8C-72E888F130BC}" type="datetimeFigureOut">
               <a:rPr lang="en-GB" smtClean="0"/>
-              <a:t>08/07/2020</a:t>
+              <a:t>12/07/2020</a:t>
             </a:fld>
             <a:endParaRPr lang="en-GB" dirty="0"/>
           </a:p>
@@ -1954,7 +1955,7 @@
           <a:p>
             <a:fld id="{65EF4D56-C8F2-4A57-8E8C-72E888F130BC}" type="datetimeFigureOut">
               <a:rPr lang="en-GB" smtClean="0"/>
-              <a:t>08/07/2020</a:t>
+              <a:t>12/07/2020</a:t>
             </a:fld>
             <a:endParaRPr lang="en-GB"/>
           </a:p>
@@ -2369,7 +2370,7 @@
           <a:p>
             <a:fld id="{65EF4D56-C8F2-4A57-8E8C-72E888F130BC}" type="datetimeFigureOut">
               <a:rPr lang="en-GB" smtClean="0"/>
-              <a:t>08/07/2020</a:t>
+              <a:t>12/07/2020</a:t>
             </a:fld>
             <a:endParaRPr lang="en-GB"/>
           </a:p>
@@ -2511,7 +2512,7 @@
           <a:p>
             <a:fld id="{65EF4D56-C8F2-4A57-8E8C-72E888F130BC}" type="datetimeFigureOut">
               <a:rPr lang="en-GB" smtClean="0"/>
-              <a:t>08/07/2020</a:t>
+              <a:t>12/07/2020</a:t>
             </a:fld>
             <a:endParaRPr lang="en-GB"/>
           </a:p>
@@ -2624,7 +2625,7 @@
           <a:p>
             <a:fld id="{65EF4D56-C8F2-4A57-8E8C-72E888F130BC}" type="datetimeFigureOut">
               <a:rPr lang="en-GB" smtClean="0"/>
-              <a:t>08/07/2020</a:t>
+              <a:t>12/07/2020</a:t>
             </a:fld>
             <a:endParaRPr lang="en-GB"/>
           </a:p>
@@ -2937,7 +2938,7 @@
           <a:p>
             <a:fld id="{65EF4D56-C8F2-4A57-8E8C-72E888F130BC}" type="datetimeFigureOut">
               <a:rPr lang="en-GB" smtClean="0"/>
-              <a:t>08/07/2020</a:t>
+              <a:t>12/07/2020</a:t>
             </a:fld>
             <a:endParaRPr lang="en-GB"/>
           </a:p>
@@ -3226,7 +3227,7 @@
           <a:p>
             <a:fld id="{65EF4D56-C8F2-4A57-8E8C-72E888F130BC}" type="datetimeFigureOut">
               <a:rPr lang="en-GB" smtClean="0"/>
-              <a:t>08/07/2020</a:t>
+              <a:t>12/07/2020</a:t>
             </a:fld>
             <a:endParaRPr lang="en-GB"/>
           </a:p>
@@ -3469,7 +3470,7 @@
           <a:p>
             <a:fld id="{65EF4D56-C8F2-4A57-8E8C-72E888F130BC}" type="datetimeFigureOut">
               <a:rPr lang="en-GB" smtClean="0"/>
-              <a:t>08/07/2020</a:t>
+              <a:t>12/07/2020</a:t>
             </a:fld>
             <a:endParaRPr lang="en-GB"/>
           </a:p>
@@ -3986,6 +3987,262 @@
           <p:cNvPr id="2" name="Titolo 1">
             <a:extLst>
               <a:ext uri="{FF2B5EF4-FFF2-40B4-BE49-F238E27FC236}">
+                <a16:creationId xmlns:a16="http://schemas.microsoft.com/office/drawing/2014/main" id="{BFB7A5D0-DA95-4157-9164-836586F47823}"/>
+              </a:ext>
+            </a:extLst>
+          </p:cNvPr>
+          <p:cNvSpPr>
+            <a:spLocks noGrp="1"/>
+          </p:cNvSpPr>
+          <p:nvPr>
+            <p:ph type="title"/>
+          </p:nvPr>
+        </p:nvSpPr>
+        <p:spPr/>
+        <p:txBody>
+          <a:bodyPr/>
+          <a:lstStyle/>
+          <a:p>
+            <a:r>
+              <a:rPr lang="en-GB" dirty="0"/>
+              <a:t>Distance from limits optimization</a:t>
+            </a:r>
+          </a:p>
+        </p:txBody>
+      </p:sp>
+      <mc:AlternateContent xmlns:mc="http://schemas.openxmlformats.org/markup-compatibility/2006">
+        <mc:Choice xmlns:a14="http://schemas.microsoft.com/office/drawing/2010/main" Requires="a14">
+          <p:sp>
+            <p:nvSpPr>
+              <p:cNvPr id="3" name="Segnaposto contenuto 2">
+                <a:extLst>
+                  <a:ext uri="{FF2B5EF4-FFF2-40B4-BE49-F238E27FC236}">
+                    <a16:creationId xmlns:a16="http://schemas.microsoft.com/office/drawing/2014/main" id="{73EEA46E-BFC9-4EF6-8DAC-948FEFC65070}"/>
+                  </a:ext>
+                </a:extLst>
+              </p:cNvPr>
+              <p:cNvSpPr>
+                <a:spLocks noGrp="1"/>
+              </p:cNvSpPr>
+              <p:nvPr>
+                <p:ph idx="1"/>
+              </p:nvPr>
+            </p:nvSpPr>
+            <p:spPr>
+              <a:xfrm>
+                <a:off x="217256" y="1489749"/>
+                <a:ext cx="11624138" cy="4643920"/>
+              </a:xfrm>
+            </p:spPr>
+            <p:txBody>
+              <a:bodyPr>
+                <a:normAutofit/>
+              </a:bodyPr>
+              <a:lstStyle/>
+              <a:p>
+                <a:pPr lvl="1">
+                  <a:spcBef>
+                    <a:spcPts val="3600"/>
+                  </a:spcBef>
+                  <a:buClr>
+                    <a:schemeClr val="accent2">
+                      <a:lumMod val="75000"/>
+                    </a:schemeClr>
+                  </a:buClr>
+                </a:pPr>
+                <a:r>
+                  <a:rPr lang="it-IT" sz="3200" dirty="0"/>
+                  <a:t>The </a:t>
+                </a:r>
+                <a:r>
+                  <a:rPr lang="it-IT" sz="3200" dirty="0" err="1"/>
+                  <a:t>value</a:t>
+                </a:r>
+                <a:r>
+                  <a:rPr lang="it-IT" sz="3200" dirty="0"/>
+                  <a:t> of </a:t>
+                </a:r>
+                <a14:m>
+                  <m:oMath xmlns:m="http://schemas.openxmlformats.org/officeDocument/2006/math">
+                    <m:r>
+                      <a:rPr lang="it-IT" sz="2800" b="0" i="1" smtClean="0">
+                        <a:latin typeface="Cambria Math" panose="02040503050406030204" pitchFamily="18" charset="0"/>
+                      </a:rPr>
+                      <m:t>𝑑</m:t>
+                    </m:r>
+                    <m:acc>
+                      <m:accPr>
+                        <m:chr m:val="̇"/>
+                        <m:ctrlPr>
+                          <a:rPr lang="en-GB" sz="2800" i="1" smtClean="0">
+                            <a:latin typeface="Cambria Math" panose="02040503050406030204" pitchFamily="18" charset="0"/>
+                          </a:rPr>
+                        </m:ctrlPr>
+                      </m:accPr>
+                      <m:e>
+                        <m:sSub>
+                          <m:sSubPr>
+                            <m:ctrlPr>
+                              <a:rPr lang="it-IT" sz="2800" b="0" i="1" smtClean="0">
+                                <a:latin typeface="Cambria Math" panose="02040503050406030204" pitchFamily="18" charset="0"/>
+                              </a:rPr>
+                            </m:ctrlPr>
+                          </m:sSubPr>
+                          <m:e>
+                            <m:r>
+                              <a:rPr lang="it-IT" sz="2800" b="0" i="1" smtClean="0">
+                                <a:latin typeface="Cambria Math" panose="02040503050406030204" pitchFamily="18" charset="0"/>
+                              </a:rPr>
+                              <m:t>𝑞</m:t>
+                            </m:r>
+                          </m:e>
+                          <m:sub>
+                            <m:r>
+                              <a:rPr lang="it-IT" sz="2800" b="0" i="1" smtClean="0">
+                                <a:latin typeface="Cambria Math" panose="02040503050406030204" pitchFamily="18" charset="0"/>
+                              </a:rPr>
+                              <m:t>0</m:t>
+                            </m:r>
+                          </m:sub>
+                        </m:sSub>
+                      </m:e>
+                    </m:acc>
+                  </m:oMath>
+                </a14:m>
+                <a:r>
+                  <a:rPr lang="en-GB" sz="2800" dirty="0"/>
+                  <a:t> </a:t>
+                </a:r>
+                <a:r>
+                  <a:rPr lang="en-GB" sz="3200" dirty="0"/>
+                  <a:t>can be computed to maximize the distance of a joint from a specific point in space</a:t>
+                </a:r>
+              </a:p>
+              <a:p>
+                <a:pPr lvl="1">
+                  <a:spcBef>
+                    <a:spcPts val="3600"/>
+                  </a:spcBef>
+                  <a:buClr>
+                    <a:schemeClr val="accent2">
+                      <a:lumMod val="75000"/>
+                    </a:schemeClr>
+                  </a:buClr>
+                </a:pPr>
+                <a:endParaRPr lang="en-GB" sz="3200" dirty="0"/>
+              </a:p>
+            </p:txBody>
+          </p:sp>
+        </mc:Choice>
+        <mc:Fallback>
+          <p:sp>
+            <p:nvSpPr>
+              <p:cNvPr id="3" name="Segnaposto contenuto 2">
+                <a:extLst>
+                  <a:ext uri="{FF2B5EF4-FFF2-40B4-BE49-F238E27FC236}">
+                    <a16:creationId xmlns:a16="http://schemas.microsoft.com/office/drawing/2014/main" id="{73EEA46E-BFC9-4EF6-8DAC-948FEFC65070}"/>
+                  </a:ext>
+                </a:extLst>
+              </p:cNvPr>
+              <p:cNvSpPr>
+                <a:spLocks noGrp="1" noRot="1" noChangeAspect="1" noMove="1" noResize="1" noEditPoints="1" noAdjustHandles="1" noChangeArrowheads="1" noChangeShapeType="1" noTextEdit="1"/>
+              </p:cNvSpPr>
+              <p:nvPr>
+                <p:ph idx="1"/>
+              </p:nvPr>
+            </p:nvSpPr>
+            <p:spPr>
+              <a:xfrm>
+                <a:off x="217256" y="1489749"/>
+                <a:ext cx="11624138" cy="4643920"/>
+              </a:xfrm>
+              <a:blipFill>
+                <a:blip r:embed="rId2"/>
+                <a:stretch>
+                  <a:fillRect t="-2756" r="-315"/>
+                </a:stretch>
+              </a:blipFill>
+            </p:spPr>
+            <p:txBody>
+              <a:bodyPr/>
+              <a:lstStyle/>
+              <a:p>
+                <a:r>
+                  <a:rPr lang="en-GB">
+                    <a:noFill/>
+                  </a:rPr>
+                  <a:t> </a:t>
+                </a:r>
+              </a:p>
+            </p:txBody>
+          </p:sp>
+        </mc:Fallback>
+      </mc:AlternateContent>
+      <p:pic>
+        <p:nvPicPr>
+          <p:cNvPr id="7" name="Immagine 6">
+            <a:extLst>
+              <a:ext uri="{FF2B5EF4-FFF2-40B4-BE49-F238E27FC236}">
+                <a16:creationId xmlns:a16="http://schemas.microsoft.com/office/drawing/2014/main" id="{1B0D647D-66C5-4743-B748-B4AF4D780ADA}"/>
+              </a:ext>
+            </a:extLst>
+          </p:cNvPr>
+          <p:cNvPicPr>
+            <a:picLocks noChangeAspect="1"/>
+          </p:cNvPicPr>
+          <p:nvPr/>
+        </p:nvPicPr>
+        <p:blipFill>
+          <a:blip r:embed="rId3"/>
+          <a:stretch>
+            <a:fillRect/>
+          </a:stretch>
+        </p:blipFill>
+        <p:spPr>
+          <a:xfrm>
+            <a:off x="2540999" y="2221010"/>
+            <a:ext cx="7110002" cy="4688307"/>
+          </a:xfrm>
+          <a:prstGeom prst="rect">
+            <a:avLst/>
+          </a:prstGeom>
+        </p:spPr>
+      </p:pic>
+    </p:spTree>
+    <p:extLst>
+      <p:ext uri="{BB962C8B-B14F-4D97-AF65-F5344CB8AC3E}">
+        <p14:creationId xmlns:p14="http://schemas.microsoft.com/office/powerpoint/2010/main" val="2471231932"/>
+      </p:ext>
+    </p:extLst>
+  </p:cSld>
+  <p:clrMapOvr>
+    <a:masterClrMapping/>
+  </p:clrMapOvr>
+</p:sld>
+</file>
+
+<file path=ppt/slides/slide11.xml><?xml version="1.0" encoding="utf-8"?>
+<p:sld xmlns:a="http://schemas.openxmlformats.org/drawingml/2006/main" xmlns:r="http://schemas.openxmlformats.org/officeDocument/2006/relationships" xmlns:p="http://schemas.openxmlformats.org/presentationml/2006/main">
+  <p:cSld>
+    <p:spTree>
+      <p:nvGrpSpPr>
+        <p:cNvPr id="1" name=""/>
+        <p:cNvGrpSpPr/>
+        <p:nvPr/>
+      </p:nvGrpSpPr>
+      <p:grpSpPr>
+        <a:xfrm>
+          <a:off x="0" y="0"/>
+          <a:ext cx="0" cy="0"/>
+          <a:chOff x="0" y="0"/>
+          <a:chExt cx="0" cy="0"/>
+        </a:xfrm>
+      </p:grpSpPr>
+      <p:sp>
+        <p:nvSpPr>
+          <p:cNvPr id="2" name="Titolo 1">
+            <a:extLst>
+              <a:ext uri="{FF2B5EF4-FFF2-40B4-BE49-F238E27FC236}">
                 <a16:creationId xmlns:a16="http://schemas.microsoft.com/office/drawing/2014/main" id="{1D151696-17F2-4DDE-9C14-7158B4F9ACCA}"/>
               </a:ext>
             </a:extLst>
@@ -4268,7 +4525,7 @@
 </p:sld>
 </file>
 
-<file path=ppt/slides/slide11.xml><?xml version="1.0" encoding="utf-8"?>
+<file path=ppt/slides/slide12.xml><?xml version="1.0" encoding="utf-8"?>
 <p:sld xmlns:a="http://schemas.openxmlformats.org/drawingml/2006/main" xmlns:r="http://schemas.openxmlformats.org/officeDocument/2006/relationships" xmlns:p="http://schemas.openxmlformats.org/presentationml/2006/main">
   <p:cSld>
     <p:spTree>
@@ -6630,8 +6887,8 @@
           </a:p>
         </p:txBody>
       </p:sp>
-      <mc:AlternateContent xmlns:mc="http://schemas.openxmlformats.org/markup-compatibility/2006">
-        <mc:Choice xmlns:a14="http://schemas.microsoft.com/office/drawing/2010/main" Requires="a14">
+      <mc:AlternateContent xmlns:mc="http://schemas.openxmlformats.org/markup-compatibility/2006" xmlns:a14="http://schemas.microsoft.com/office/drawing/2010/main">
+        <mc:Choice Requires="a14">
           <p:sp>
             <p:nvSpPr>
               <p:cNvPr id="3" name="Segnaposto contenuto 2">
@@ -6920,7 +7177,7 @@
             </p:txBody>
           </p:sp>
         </mc:Choice>
-        <mc:Fallback>
+        <mc:Fallback xmlns="">
           <p:sp>
             <p:nvSpPr>
               <p:cNvPr id="3" name="Segnaposto contenuto 2">
@@ -7022,8 +7279,8 @@
           </a:p>
         </p:txBody>
       </p:sp>
-      <mc:AlternateContent xmlns:mc="http://schemas.openxmlformats.org/markup-compatibility/2006">
-        <mc:Choice xmlns:a14="http://schemas.microsoft.com/office/drawing/2010/main" Requires="a14">
+      <mc:AlternateContent xmlns:mc="http://schemas.openxmlformats.org/markup-compatibility/2006" xmlns:a14="http://schemas.microsoft.com/office/drawing/2010/main">
+        <mc:Choice Requires="a14">
           <p:sp>
             <p:nvSpPr>
               <p:cNvPr id="3" name="Segnaposto contenuto 2">
@@ -7421,7 +7678,7 @@
             </p:txBody>
           </p:sp>
         </mc:Choice>
-        <mc:Fallback>
+        <mc:Fallback xmlns="">
           <p:sp>
             <p:nvSpPr>
               <p:cNvPr id="3" name="Segnaposto contenuto 2">

</xml_diff>